<commit_message>
Finished Source -> PDF Remove papers not being presented or that will not have time to be fixed up
</commit_message>
<xml_diff>
--- a/papers/presentations/source/d1097.pptx
+++ b/papers/presentations/source/d1097.pptx
@@ -7168,7 +7168,7 @@
             <a:pPr lvl="1"/>
             <a:r>
               <a:rPr lang="en-US" dirty="0"/>
-              <a:t>Extremely lose forward-compatible matching is demonstrated (ignore underscore, medial hyphen, spaces, etc..)</a:t>
+              <a:t>Extremely loose forward-compatible matching is demonstrated (ignore underscore, medial hyphen, spaces, etc..)</a:t>
             </a:r>
           </a:p>
           <a:p>
@@ -7292,22 +7292,14 @@
             <a:pPr lvl="1"/>
             <a:r>
               <a:rPr lang="en-US" dirty="0"/>
-              <a:t>Some </a:t>
-            </a:r>
-            <a:r>
-              <a:rPr lang="en-US" dirty="0" err="1"/>
-              <a:t>impedence</a:t>
-            </a:r>
+              <a:t>Some impedance mismatch with {ZERO-WIDTH-SPACE} versus {ZERO-WIDTH SPACE}</a:t>
+            </a:r>
+          </a:p>
+          <a:p>
+            <a:pPr lvl="2"/>
             <a:r>
               <a:rPr lang="en-US" dirty="0"/>
-              <a:t> mismatch with {ZERO-WIDTH-SPACE} versus {ZERO-WIDTH SPACE}</a:t>
-            </a:r>
-          </a:p>
-          <a:p>
-            <a:pPr lvl="2"/>
-            <a:r>
-              <a:rPr lang="en-US" dirty="0"/>
-              <a:t>Compiler can just errors on inability to find a proper escape sequence to prevent silent spelling errors</a:t>
+              <a:t>Compiler can error on inability to find a proper escape sequence to prevent silent spelling errors</a:t>
             </a:r>
           </a:p>
           <a:p>

</xml_diff>

<commit_message>
update all papers and shift over
</commit_message>
<xml_diff>
--- a/papers/presentations/source/d1097.pptx
+++ b/papers/presentations/source/d1097.pptx
@@ -15,6 +15,7 @@
     <p:sldId id="265" r:id="rId9"/>
     <p:sldId id="266" r:id="rId10"/>
     <p:sldId id="260" r:id="rId11"/>
+    <p:sldId id="268" r:id="rId12"/>
   </p:sldIdLst>
   <p:sldSz cx="12192000" cy="6858000"/>
   <p:notesSz cx="6858000" cy="9144000"/>
@@ -6106,6 +6107,283 @@
 </p:sld>
 </file>
 
+<file path=ppt/slides/slide11.xml><?xml version="1.0" encoding="utf-8"?>
+<p:sld xmlns:a="http://schemas.openxmlformats.org/drawingml/2006/main" xmlns:r="http://schemas.openxmlformats.org/officeDocument/2006/relationships" xmlns:p="http://schemas.openxmlformats.org/presentationml/2006/main">
+  <p:cSld>
+    <p:spTree>
+      <p:nvGrpSpPr>
+        <p:cNvPr id="1" name=""/>
+        <p:cNvGrpSpPr/>
+        <p:nvPr/>
+      </p:nvGrpSpPr>
+      <p:grpSpPr>
+        <a:xfrm>
+          <a:off x="0" y="0"/>
+          <a:ext cx="0" cy="0"/>
+          <a:chOff x="0" y="0"/>
+          <a:chExt cx="0" cy="0"/>
+        </a:xfrm>
+      </p:grpSpPr>
+      <p:sp>
+        <p:nvSpPr>
+          <p:cNvPr id="2" name="Title 1">
+            <a:extLst>
+              <a:ext uri="{FF2B5EF4-FFF2-40B4-BE49-F238E27FC236}">
+                <a16:creationId xmlns:a16="http://schemas.microsoft.com/office/drawing/2014/main" id="{F524DB8D-7C5D-4499-BCA1-69B2E7656A70}"/>
+              </a:ext>
+            </a:extLst>
+          </p:cNvPr>
+          <p:cNvSpPr>
+            <a:spLocks noGrp="1"/>
+          </p:cNvSpPr>
+          <p:nvPr>
+            <p:ph type="title"/>
+          </p:nvPr>
+        </p:nvSpPr>
+        <p:spPr/>
+        <p:txBody>
+          <a:bodyPr/>
+          <a:lstStyle/>
+          <a:p>
+            <a:r>
+              <a:rPr lang="en-US" dirty="0"/>
+              <a:t>Questions?</a:t>
+            </a:r>
+          </a:p>
+        </p:txBody>
+      </p:sp>
+      <p:sp>
+        <p:nvSpPr>
+          <p:cNvPr id="3" name="Content Placeholder 2">
+            <a:extLst>
+              <a:ext uri="{FF2B5EF4-FFF2-40B4-BE49-F238E27FC236}">
+                <a16:creationId xmlns:a16="http://schemas.microsoft.com/office/drawing/2014/main" id="{A58FFB03-1475-4E9B-B903-51F43B321577}"/>
+              </a:ext>
+            </a:extLst>
+          </p:cNvPr>
+          <p:cNvSpPr>
+            <a:spLocks noGrp="1"/>
+          </p:cNvSpPr>
+          <p:nvPr>
+            <p:ph idx="1"/>
+          </p:nvPr>
+        </p:nvSpPr>
+        <p:spPr>
+          <a:xfrm>
+            <a:off x="685801" y="2142067"/>
+            <a:ext cx="10131425" cy="4570967"/>
+          </a:xfrm>
+        </p:spPr>
+        <p:txBody>
+          <a:bodyPr/>
+          <a:lstStyle/>
+          <a:p>
+            <a:r>
+              <a:rPr lang="en-US" dirty="0"/>
+              <a:t>Do we want named escape sequences? (Recommended: </a:t>
+            </a:r>
+            <a:r>
+              <a:rPr lang="en-US" b="1" i="1" dirty="0"/>
+              <a:t>Yes</a:t>
+            </a:r>
+            <a:r>
+              <a:rPr lang="en-US" dirty="0"/>
+              <a:t>)</a:t>
+            </a:r>
+          </a:p>
+          <a:p>
+            <a:pPr lvl="1"/>
+            <a:r>
+              <a:rPr lang="en-US" dirty="0">
+                <a:solidFill>
+                  <a:srgbClr val="FFC000"/>
+                </a:solidFill>
+                <a:latin typeface="Consolas" panose="020B0609020204030204" pitchFamily="49" charset="0"/>
+              </a:rPr>
+              <a:t>“\N{NO-BREAK SPACE}”</a:t>
+            </a:r>
+            <a:br>
+              <a:rPr lang="en-US" dirty="0"/>
+            </a:br>
+            <a:endParaRPr lang="en-US" dirty="0"/>
+          </a:p>
+          <a:p>
+            <a:r>
+              <a:rPr lang="en-US" dirty="0"/>
+              <a:t>Do we want to support name aliases? (Recommended: </a:t>
+            </a:r>
+            <a:r>
+              <a:rPr lang="en-US" b="1" i="1" dirty="0"/>
+              <a:t>Yes</a:t>
+            </a:r>
+            <a:r>
+              <a:rPr lang="en-US" dirty="0"/>
+              <a:t>)</a:t>
+            </a:r>
+          </a:p>
+          <a:p>
+            <a:pPr lvl="1"/>
+            <a:r>
+              <a:rPr lang="en-US" dirty="0">
+                <a:solidFill>
+                  <a:srgbClr val="FFC000"/>
+                </a:solidFill>
+                <a:latin typeface="Consolas" panose="020B0609020204030204" pitchFamily="49" charset="0"/>
+              </a:rPr>
+              <a:t>“\N{NBSP}”</a:t>
+            </a:r>
+            <a:br>
+              <a:rPr lang="en-US" dirty="0"/>
+            </a:br>
+            <a:endParaRPr lang="en-US" dirty="0"/>
+          </a:p>
+          <a:p>
+            <a:r>
+              <a:rPr lang="en-US" dirty="0"/>
+              <a:t>Do we want case-insensitive matching? (Recommended: </a:t>
+            </a:r>
+            <a:r>
+              <a:rPr lang="en-US" b="1" i="1" dirty="0"/>
+              <a:t>Yes</a:t>
+            </a:r>
+            <a:r>
+              <a:rPr lang="en-US" dirty="0"/>
+              <a:t>)</a:t>
+            </a:r>
+          </a:p>
+          <a:p>
+            <a:pPr lvl="1"/>
+            <a:r>
+              <a:rPr lang="en-US" dirty="0">
+                <a:solidFill>
+                  <a:srgbClr val="FFC000"/>
+                </a:solidFill>
+                <a:latin typeface="Consolas" panose="020B0609020204030204" pitchFamily="49" charset="0"/>
+              </a:rPr>
+              <a:t>“\N{</a:t>
+            </a:r>
+            <a:r>
+              <a:rPr lang="en-US" dirty="0" err="1">
+                <a:solidFill>
+                  <a:srgbClr val="FFC000"/>
+                </a:solidFill>
+                <a:latin typeface="Consolas" panose="020B0609020204030204" pitchFamily="49" charset="0"/>
+              </a:rPr>
+              <a:t>nO-BreAK</a:t>
+            </a:r>
+            <a:r>
+              <a:rPr lang="en-US" dirty="0">
+                <a:solidFill>
+                  <a:srgbClr val="FFC000"/>
+                </a:solidFill>
+                <a:latin typeface="Consolas" panose="020B0609020204030204" pitchFamily="49" charset="0"/>
+              </a:rPr>
+              <a:t> </a:t>
+            </a:r>
+            <a:r>
+              <a:rPr lang="en-US" dirty="0" err="1">
+                <a:solidFill>
+                  <a:srgbClr val="FFC000"/>
+                </a:solidFill>
+                <a:latin typeface="Consolas" panose="020B0609020204030204" pitchFamily="49" charset="0"/>
+              </a:rPr>
+              <a:t>SpAcE</a:t>
+            </a:r>
+            <a:r>
+              <a:rPr lang="en-US" dirty="0">
+                <a:solidFill>
+                  <a:srgbClr val="FFC000"/>
+                </a:solidFill>
+                <a:latin typeface="Consolas" panose="020B0609020204030204" pitchFamily="49" charset="0"/>
+              </a:rPr>
+              <a:t>}”</a:t>
+            </a:r>
+            <a:br>
+              <a:rPr lang="en-US" dirty="0"/>
+            </a:br>
+            <a:endParaRPr lang="en-US" dirty="0"/>
+          </a:p>
+          <a:p>
+            <a:r>
+              <a:rPr lang="en-US" dirty="0"/>
+              <a:t>Do we want full UAX #44 LM2 name matching?</a:t>
+            </a:r>
+          </a:p>
+          <a:p>
+            <a:pPr lvl="1"/>
+            <a:r>
+              <a:rPr lang="en-US" dirty="0">
+                <a:solidFill>
+                  <a:srgbClr val="FFC000"/>
+                </a:solidFill>
+                <a:latin typeface="Consolas" panose="020B0609020204030204" pitchFamily="49" charset="0"/>
+              </a:rPr>
+              <a:t>“\N{</a:t>
+            </a:r>
+            <a:r>
+              <a:rPr lang="en-US" dirty="0" err="1">
+                <a:solidFill>
+                  <a:srgbClr val="FFC000"/>
+                </a:solidFill>
+                <a:latin typeface="Consolas" panose="020B0609020204030204" pitchFamily="49" charset="0"/>
+              </a:rPr>
+              <a:t>no_bREA_k</a:t>
+            </a:r>
+            <a:r>
+              <a:rPr lang="en-US" dirty="0">
+                <a:solidFill>
+                  <a:srgbClr val="FFC000"/>
+                </a:solidFill>
+                <a:latin typeface="Consolas" panose="020B0609020204030204" pitchFamily="49" charset="0"/>
+              </a:rPr>
+              <a:t> S P A C E}”</a:t>
+            </a:r>
+          </a:p>
+          <a:p>
+            <a:pPr lvl="1"/>
+            <a:r>
+              <a:rPr lang="en-US" dirty="0">
+                <a:solidFill>
+                  <a:srgbClr val="FFC000"/>
+                </a:solidFill>
+                <a:latin typeface="Consolas" panose="020B0609020204030204" pitchFamily="49" charset="0"/>
+              </a:rPr>
+              <a:t>“\N{</a:t>
+            </a:r>
+            <a:r>
+              <a:rPr lang="en-US" dirty="0" err="1">
+                <a:solidFill>
+                  <a:srgbClr val="FFC000"/>
+                </a:solidFill>
+                <a:latin typeface="Consolas" panose="020B0609020204030204" pitchFamily="49" charset="0"/>
+              </a:rPr>
+              <a:t>No_BR</a:t>
+            </a:r>
+            <a:r>
+              <a:rPr lang="en-US" dirty="0">
+                <a:solidFill>
+                  <a:srgbClr val="FFC000"/>
+                </a:solidFill>
+                <a:latin typeface="Consolas" panose="020B0609020204030204" pitchFamily="49" charset="0"/>
+              </a:rPr>
+              <a:t> E A_K_S-P-A-C_E}”</a:t>
+            </a:r>
+          </a:p>
+        </p:txBody>
+      </p:sp>
+    </p:spTree>
+    <p:extLst>
+      <p:ext uri="{BB962C8B-B14F-4D97-AF65-F5344CB8AC3E}">
+        <p14:creationId xmlns:p14="http://schemas.microsoft.com/office/powerpoint/2010/main" val="2117076704"/>
+      </p:ext>
+    </p:extLst>
+  </p:cSld>
+  <p:clrMapOvr>
+    <a:masterClrMapping/>
+  </p:clrMapOvr>
+</p:sld>
+</file>
+
 <file path=ppt/slides/slide2.xml><?xml version="1.0" encoding="utf-8"?>
 <p:sld xmlns:a="http://schemas.openxmlformats.org/drawingml/2006/main" xmlns:r="http://schemas.openxmlformats.org/officeDocument/2006/relationships" xmlns:p="http://schemas.openxmlformats.org/presentationml/2006/main">
   <p:cSld>
@@ -6687,6 +6965,34 @@
           <a:chExt cx="0" cy="0"/>
         </a:xfrm>
       </p:grpSpPr>
+      <p:sp>
+        <p:nvSpPr>
+          <p:cNvPr id="2" name="Title 1">
+            <a:extLst>
+              <a:ext uri="{FF2B5EF4-FFF2-40B4-BE49-F238E27FC236}">
+                <a16:creationId xmlns:a16="http://schemas.microsoft.com/office/drawing/2014/main" id="{ACAC882F-8A43-43DB-85C9-B0ABA1A2D55D}"/>
+              </a:ext>
+            </a:extLst>
+          </p:cNvPr>
+          <p:cNvSpPr>
+            <a:spLocks noGrp="1"/>
+          </p:cNvSpPr>
+          <p:nvPr>
+            <p:ph type="title"/>
+          </p:nvPr>
+        </p:nvSpPr>
+        <p:spPr/>
+        <p:txBody>
+          <a:bodyPr/>
+          <a:lstStyle/>
+          <a:p>
+            <a:r>
+              <a:rPr lang="en-US" dirty="0"/>
+              <a:t>Motivation…</a:t>
+            </a:r>
+          </a:p>
+        </p:txBody>
+      </p:sp>
       <p:pic>
         <p:nvPicPr>
           <p:cNvPr id="5" name="Content Placeholder 4">
@@ -6703,16 +7009,15 @@
             <p:ph idx="1"/>
           </p:nvPr>
         </p:nvPicPr>
-        <p:blipFill>
+        <p:blipFill rotWithShape="1">
           <a:blip r:embed="rId2"/>
-          <a:stretch>
-            <a:fillRect/>
-          </a:stretch>
+          <a:srcRect l="1884" r="8752" b="31639"/>
+          <a:stretch/>
         </p:blipFill>
         <p:spPr>
           <a:xfrm>
-            <a:off x="512382" y="174514"/>
-            <a:ext cx="11066471" cy="6487931"/>
+            <a:off x="853069" y="1849923"/>
+            <a:ext cx="10844560" cy="4863580"/>
           </a:xfrm>
         </p:spPr>
       </p:pic>

</xml_diff>